<commit_message>
Update Developer and User Guide
</commit_message>
<xml_diff>
--- a/docs/diagrams/HighLevelSequenceDiagrams.pptx
+++ b/docs/diagrams/HighLevelSequenceDiagrams.pptx
@@ -107,6 +107,22 @@
       </a:defRPr>
     </a:lvl9pPr>
   </p:defaultTextStyle>
+  <p:extLst>
+    <p:ext uri="{EFAFB233-063F-42B5-8137-9DF3F51BA10A}">
+      <p15:sldGuideLst xmlns:p15="http://schemas.microsoft.com/office/powerpoint/2012/main">
+        <p15:guide id="1" orient="horz" pos="1488">
+          <p15:clr>
+            <a:srgbClr val="A4A3A4"/>
+          </p15:clr>
+        </p15:guide>
+        <p15:guide id="2" pos="2880">
+          <p15:clr>
+            <a:srgbClr val="A4A3A4"/>
+          </p15:clr>
+        </p15:guide>
+      </p15:sldGuideLst>
+    </p:ext>
+  </p:extLst>
 </p:presentation>
 </file>
 
@@ -192,7 +208,7 @@
           <a:p>
             <a:fld id="{F5CC4B3F-88C1-4FFA-B1B6-F41C21DC6924}" type="datetimeFigureOut">
               <a:rPr lang="en-US" smtClean="0"/>
-              <a:t>10/16/2016</a:t>
+              <a:t>4/13/18</a:t>
             </a:fld>
             <a:endParaRPr lang="en-US"/>
           </a:p>
@@ -641,7 +657,7 @@
           <a:p>
             <a:fld id="{78C97017-6FC3-485B-9764-EAC9E56C1D49}" type="datetimeFigureOut">
               <a:rPr lang="en-US" smtClean="0"/>
-              <a:t>10/16/2016</a:t>
+              <a:t>4/13/18</a:t>
             </a:fld>
             <a:endParaRPr lang="en-US"/>
           </a:p>
@@ -811,7 +827,7 @@
           <a:p>
             <a:fld id="{78C97017-6FC3-485B-9764-EAC9E56C1D49}" type="datetimeFigureOut">
               <a:rPr lang="en-US" smtClean="0"/>
-              <a:t>10/16/2016</a:t>
+              <a:t>4/13/18</a:t>
             </a:fld>
             <a:endParaRPr lang="en-US"/>
           </a:p>
@@ -991,7 +1007,7 @@
           <a:p>
             <a:fld id="{78C97017-6FC3-485B-9764-EAC9E56C1D49}" type="datetimeFigureOut">
               <a:rPr lang="en-US" smtClean="0"/>
-              <a:t>10/16/2016</a:t>
+              <a:t>4/13/18</a:t>
             </a:fld>
             <a:endParaRPr lang="en-US"/>
           </a:p>
@@ -1161,7 +1177,7 @@
           <a:p>
             <a:fld id="{78C97017-6FC3-485B-9764-EAC9E56C1D49}" type="datetimeFigureOut">
               <a:rPr lang="en-US" smtClean="0"/>
-              <a:t>10/16/2016</a:t>
+              <a:t>4/13/18</a:t>
             </a:fld>
             <a:endParaRPr lang="en-US"/>
           </a:p>
@@ -1407,7 +1423,7 @@
           <a:p>
             <a:fld id="{78C97017-6FC3-485B-9764-EAC9E56C1D49}" type="datetimeFigureOut">
               <a:rPr lang="en-US" smtClean="0"/>
-              <a:t>10/16/2016</a:t>
+              <a:t>4/13/18</a:t>
             </a:fld>
             <a:endParaRPr lang="en-US"/>
           </a:p>
@@ -1695,7 +1711,7 @@
           <a:p>
             <a:fld id="{78C97017-6FC3-485B-9764-EAC9E56C1D49}" type="datetimeFigureOut">
               <a:rPr lang="en-US" smtClean="0"/>
-              <a:t>10/16/2016</a:t>
+              <a:t>4/13/18</a:t>
             </a:fld>
             <a:endParaRPr lang="en-US"/>
           </a:p>
@@ -2117,7 +2133,7 @@
           <a:p>
             <a:fld id="{78C97017-6FC3-485B-9764-EAC9E56C1D49}" type="datetimeFigureOut">
               <a:rPr lang="en-US" smtClean="0"/>
-              <a:t>10/16/2016</a:t>
+              <a:t>4/13/18</a:t>
             </a:fld>
             <a:endParaRPr lang="en-US"/>
           </a:p>
@@ -2235,7 +2251,7 @@
           <a:p>
             <a:fld id="{78C97017-6FC3-485B-9764-EAC9E56C1D49}" type="datetimeFigureOut">
               <a:rPr lang="en-US" smtClean="0"/>
-              <a:t>10/16/2016</a:t>
+              <a:t>4/13/18</a:t>
             </a:fld>
             <a:endParaRPr lang="en-US"/>
           </a:p>
@@ -2330,7 +2346,7 @@
           <a:p>
             <a:fld id="{78C97017-6FC3-485B-9764-EAC9E56C1D49}" type="datetimeFigureOut">
               <a:rPr lang="en-US" smtClean="0"/>
-              <a:t>10/16/2016</a:t>
+              <a:t>4/13/18</a:t>
             </a:fld>
             <a:endParaRPr lang="en-US"/>
           </a:p>
@@ -2607,7 +2623,7 @@
           <a:p>
             <a:fld id="{78C97017-6FC3-485B-9764-EAC9E56C1D49}" type="datetimeFigureOut">
               <a:rPr lang="en-US" smtClean="0"/>
-              <a:t>10/16/2016</a:t>
+              <a:t>4/13/18</a:t>
             </a:fld>
             <a:endParaRPr lang="en-US"/>
           </a:p>
@@ -2860,7 +2876,7 @@
           <a:p>
             <a:fld id="{78C97017-6FC3-485B-9764-EAC9E56C1D49}" type="datetimeFigureOut">
               <a:rPr lang="en-US" smtClean="0"/>
-              <a:t>10/16/2016</a:t>
+              <a:t>4/13/18</a:t>
             </a:fld>
             <a:endParaRPr lang="en-US"/>
           </a:p>
@@ -3073,7 +3089,7 @@
           <a:p>
             <a:fld id="{78C97017-6FC3-485B-9764-EAC9E56C1D49}" type="datetimeFigureOut">
               <a:rPr lang="en-US" smtClean="0"/>
-              <a:t>10/16/2016</a:t>
+              <a:t>4/13/18</a:t>
             </a:fld>
             <a:endParaRPr lang="en-US"/>
           </a:p>
@@ -3450,24 +3466,28 @@
       </p:grpSpPr>
       <p:sp>
         <p:nvSpPr>
-          <p:cNvPr id="2" name="Rectangle 62"/>
+          <p:cNvPr id="53" name="Rectangle 62"/>
           <p:cNvSpPr/>
           <p:nvPr/>
         </p:nvSpPr>
         <p:spPr>
           <a:xfrm>
-            <a:off x="1111860" y="607926"/>
+            <a:off x="7370178" y="2971800"/>
             <a:ext cx="1093635" cy="346760"/>
           </a:xfrm>
           <a:prstGeom prst="rect">
             <a:avLst/>
           </a:prstGeom>
           <a:solidFill>
-            <a:srgbClr val="00B050"/>
+            <a:schemeClr val="accent6">
+              <a:lumMod val="75000"/>
+            </a:schemeClr>
           </a:solidFill>
           <a:ln w="19050">
             <a:solidFill>
-              <a:srgbClr val="00B050"/>
+              <a:schemeClr val="accent6">
+                <a:lumMod val="75000"/>
+              </a:schemeClr>
             </a:solidFill>
           </a:ln>
           <a:effectLst/>
@@ -3497,7 +3517,7 @@
                   <a:schemeClr val="bg1"/>
                 </a:solidFill>
               </a:rPr>
-              <a:t>:UI</a:t>
+              <a:t>:Storage</a:t>
             </a:r>
             <a:endParaRPr lang="en-SG" sz="1600" dirty="0">
               <a:solidFill>
@@ -3509,13 +3529,13 @@
       </p:sp>
       <p:cxnSp>
         <p:nvCxnSpPr>
-          <p:cNvPr id="5" name="Straight Connector 4"/>
+          <p:cNvPr id="54" name="Straight Connector 53"/>
           <p:cNvCxnSpPr/>
           <p:nvPr/>
         </p:nvCxnSpPr>
         <p:spPr>
           <a:xfrm>
-            <a:off x="1658677" y="971597"/>
+            <a:off x="7916995" y="3335471"/>
             <a:ext cx="0" cy="1723059"/>
           </a:xfrm>
           <a:prstGeom prst="line">
@@ -3523,7 +3543,9 @@
           </a:prstGeom>
           <a:ln w="19050">
             <a:solidFill>
-              <a:srgbClr val="00B050"/>
+              <a:schemeClr val="accent6">
+                <a:lumMod val="75000"/>
+              </a:schemeClr>
             </a:solidFill>
             <a:prstDash val="sysDash"/>
           </a:ln>
@@ -3546,24 +3568,28 @@
       </p:cxnSp>
       <p:sp>
         <p:nvSpPr>
-          <p:cNvPr id="6" name="Rectangle 5"/>
+          <p:cNvPr id="55" name="Rectangle 54"/>
           <p:cNvSpPr/>
           <p:nvPr/>
         </p:nvSpPr>
         <p:spPr>
           <a:xfrm>
-            <a:off x="1586669" y="1322292"/>
-            <a:ext cx="152400" cy="1019910"/>
+            <a:off x="7844987" y="4029140"/>
+            <a:ext cx="124478" cy="287409"/>
           </a:xfrm>
           <a:prstGeom prst="rect">
             <a:avLst/>
           </a:prstGeom>
           <a:solidFill>
-            <a:srgbClr val="00B050"/>
+            <a:schemeClr val="accent6">
+              <a:lumMod val="75000"/>
+            </a:schemeClr>
           </a:solidFill>
           <a:ln>
             <a:solidFill>
-              <a:srgbClr val="00B050"/>
+              <a:schemeClr val="accent6">
+                <a:lumMod val="75000"/>
+              </a:schemeClr>
             </a:solidFill>
           </a:ln>
           <a:effectLst/>
@@ -3595,277 +3621,63 @@
           </a:p>
         </p:txBody>
       </p:sp>
-      <p:grpSp>
-        <p:nvGrpSpPr>
-          <p:cNvPr id="7" name="Actor"/>
-          <p:cNvGrpSpPr/>
-          <p:nvPr/>
-        </p:nvGrpSpPr>
-        <p:grpSpPr>
-          <a:xfrm>
-            <a:off x="152400" y="533400"/>
-            <a:ext cx="324036" cy="573410"/>
-            <a:chOff x="3239901" y="4149080"/>
-            <a:chExt cx="648072" cy="1146820"/>
-          </a:xfrm>
-        </p:grpSpPr>
-        <p:sp>
-          <p:nvSpPr>
-            <p:cNvPr id="8" name="Flowchart: Connector 7"/>
-            <p:cNvSpPr/>
-            <p:nvPr/>
-          </p:nvSpPr>
-          <p:spPr>
-            <a:xfrm>
-              <a:off x="3419872" y="4149080"/>
-              <a:ext cx="288032" cy="288032"/>
-            </a:xfrm>
-            <a:prstGeom prst="flowChartConnector">
-              <a:avLst/>
-            </a:prstGeom>
-            <a:solidFill>
-              <a:schemeClr val="bg1">
-                <a:lumMod val="85000"/>
-              </a:schemeClr>
-            </a:solidFill>
-            <a:ln w="28575">
-              <a:solidFill>
-                <a:schemeClr val="tx1"/>
-              </a:solidFill>
-            </a:ln>
-            <a:effectLst/>
-          </p:spPr>
-          <p:style>
-            <a:lnRef idx="1">
-              <a:schemeClr val="accent4"/>
-            </a:lnRef>
-            <a:fillRef idx="2">
-              <a:schemeClr val="accent4"/>
-            </a:fillRef>
-            <a:effectRef idx="1">
-              <a:schemeClr val="accent4"/>
-            </a:effectRef>
-            <a:fontRef idx="minor">
-              <a:schemeClr val="dk1"/>
-            </a:fontRef>
-          </p:style>
-          <p:txBody>
-            <a:bodyPr rtlCol="0" anchor="ctr"/>
-            <a:lstStyle/>
-            <a:p>
-              <a:pPr algn="ctr"/>
-              <a:endParaRPr lang="en-SG"/>
-            </a:p>
-          </p:txBody>
-        </p:sp>
-        <p:cxnSp>
-          <p:nvCxnSpPr>
-            <p:cNvPr id="9" name="Straight Connector 8"/>
-            <p:cNvCxnSpPr>
-              <a:stCxn id="8" idx="4"/>
-            </p:cNvCxnSpPr>
-            <p:nvPr/>
-          </p:nvCxnSpPr>
-          <p:spPr>
-            <a:xfrm>
-              <a:off x="3563888" y="4437112"/>
-              <a:ext cx="0" cy="504056"/>
-            </a:xfrm>
-            <a:prstGeom prst="line">
-              <a:avLst/>
-            </a:prstGeom>
-            <a:ln w="28575">
-              <a:solidFill>
-                <a:schemeClr val="tx1"/>
-              </a:solidFill>
-            </a:ln>
-            <a:effectLst/>
-          </p:spPr>
-          <p:style>
-            <a:lnRef idx="1">
-              <a:schemeClr val="accent4"/>
-            </a:lnRef>
-            <a:fillRef idx="2">
-              <a:schemeClr val="accent4"/>
-            </a:fillRef>
-            <a:effectRef idx="1">
-              <a:schemeClr val="accent4"/>
-            </a:effectRef>
-            <a:fontRef idx="minor">
-              <a:schemeClr val="dk1"/>
-            </a:fontRef>
-          </p:style>
-        </p:cxnSp>
-        <p:sp>
-          <p:nvSpPr>
-            <p:cNvPr id="10" name="Freeform 9"/>
-            <p:cNvSpPr/>
-            <p:nvPr/>
-          </p:nvSpPr>
-          <p:spPr>
-            <a:xfrm>
-              <a:off x="3324225" y="4933950"/>
-              <a:ext cx="479425" cy="361950"/>
-            </a:xfrm>
-            <a:custGeom>
-              <a:avLst/>
-              <a:gdLst>
-                <a:gd name="connsiteX0" fmla="*/ 0 w 479425"/>
-                <a:gd name="connsiteY0" fmla="*/ 355600 h 361950"/>
-                <a:gd name="connsiteX1" fmla="*/ 241300 w 479425"/>
-                <a:gd name="connsiteY1" fmla="*/ 0 h 361950"/>
-                <a:gd name="connsiteX2" fmla="*/ 479425 w 479425"/>
-                <a:gd name="connsiteY2" fmla="*/ 361950 h 361950"/>
-              </a:gdLst>
-              <a:ahLst/>
-              <a:cxnLst>
-                <a:cxn ang="0">
-                  <a:pos x="connsiteX0" y="connsiteY0"/>
-                </a:cxn>
-                <a:cxn ang="0">
-                  <a:pos x="connsiteX1" y="connsiteY1"/>
-                </a:cxn>
-                <a:cxn ang="0">
-                  <a:pos x="connsiteX2" y="connsiteY2"/>
-                </a:cxn>
-              </a:cxnLst>
-              <a:rect l="l" t="t" r="r" b="b"/>
-              <a:pathLst>
-                <a:path w="479425" h="361950">
-                  <a:moveTo>
-                    <a:pt x="0" y="355600"/>
-                  </a:moveTo>
-                  <a:lnTo>
-                    <a:pt x="241300" y="0"/>
-                  </a:lnTo>
-                  <a:lnTo>
-                    <a:pt x="479425" y="361950"/>
-                  </a:lnTo>
-                </a:path>
-              </a:pathLst>
-            </a:custGeom>
-            <a:noFill/>
-            <a:ln w="28575">
-              <a:solidFill>
-                <a:schemeClr val="tx1"/>
-              </a:solidFill>
-            </a:ln>
-            <a:effectLst/>
-          </p:spPr>
-          <p:style>
-            <a:lnRef idx="1">
-              <a:schemeClr val="accent4"/>
-            </a:lnRef>
-            <a:fillRef idx="2">
-              <a:schemeClr val="accent4"/>
-            </a:fillRef>
-            <a:effectRef idx="1">
-              <a:schemeClr val="accent4"/>
-            </a:effectRef>
-            <a:fontRef idx="minor">
-              <a:schemeClr val="dk1"/>
-            </a:fontRef>
-          </p:style>
-          <p:txBody>
-            <a:bodyPr rtlCol="0" anchor="ctr"/>
-            <a:lstStyle/>
-            <a:p>
-              <a:pPr algn="ctr"/>
-              <a:endParaRPr lang="en-SG"/>
-            </a:p>
-          </p:txBody>
-        </p:sp>
-        <p:cxnSp>
-          <p:nvCxnSpPr>
-            <p:cNvPr id="11" name="Straight Connector 10"/>
-            <p:cNvCxnSpPr/>
-            <p:nvPr/>
-          </p:nvCxnSpPr>
-          <p:spPr>
-            <a:xfrm>
-              <a:off x="3239901" y="4509120"/>
-              <a:ext cx="648072" cy="0"/>
-            </a:xfrm>
-            <a:prstGeom prst="line">
-              <a:avLst/>
-            </a:prstGeom>
-            <a:ln w="28575">
-              <a:solidFill>
-                <a:schemeClr val="tx1"/>
-              </a:solidFill>
-            </a:ln>
-            <a:effectLst/>
-          </p:spPr>
-          <p:style>
-            <a:lnRef idx="1">
-              <a:schemeClr val="accent4"/>
-            </a:lnRef>
-            <a:fillRef idx="2">
-              <a:schemeClr val="accent4"/>
-            </a:fillRef>
-            <a:effectRef idx="1">
-              <a:schemeClr val="accent4"/>
-            </a:effectRef>
-            <a:fontRef idx="minor">
-              <a:schemeClr val="dk1"/>
-            </a:fontRef>
-          </p:style>
-        </p:cxnSp>
-      </p:grpSp>
-      <p:sp>
-        <p:nvSpPr>
-          <p:cNvPr id="16" name="Rectangle 62"/>
-          <p:cNvSpPr/>
+      <p:sp>
+        <p:nvSpPr>
+          <p:cNvPr id="62" name="TextBox 61"/>
+          <p:cNvSpPr txBox="1"/>
           <p:nvPr/>
         </p:nvSpPr>
         <p:spPr>
           <a:xfrm>
-            <a:off x="3335583" y="611613"/>
-            <a:ext cx="1093635" cy="346760"/>
+            <a:off x="1810094" y="3491152"/>
+            <a:ext cx="2716635" cy="215444"/>
           </a:xfrm>
           <a:prstGeom prst="rect">
             <a:avLst/>
           </a:prstGeom>
-          <a:solidFill>
-            <a:srgbClr val="0070C0"/>
-          </a:solidFill>
-          <a:ln w="19050">
-            <a:solidFill>
-              <a:srgbClr val="0070C0"/>
-            </a:solidFill>
-          </a:ln>
-          <a:effectLst/>
+          <a:noFill/>
         </p:spPr>
-        <p:style>
-          <a:lnRef idx="1">
-            <a:schemeClr val="accent2"/>
-          </a:lnRef>
-          <a:fillRef idx="2">
-            <a:schemeClr val="accent2"/>
-          </a:fillRef>
-          <a:effectRef idx="1">
-            <a:schemeClr val="accent2"/>
-          </a:effectRef>
-          <a:fontRef idx="minor">
-            <a:schemeClr val="dk1"/>
-          </a:fontRef>
-        </p:style>
-        <p:txBody>
-          <a:bodyPr rtlCol="0" anchor="ctr"/>
-          <a:lstStyle/>
-          <a:p>
-            <a:pPr algn="ctr"/>
-            <a:r>
-              <a:rPr lang="en-US" sz="1600" dirty="0" smtClean="0">
+        <p:txBody>
+          <a:bodyPr wrap="square" lIns="0" tIns="0" rIns="0" bIns="0" rtlCol="0">
+            <a:spAutoFit/>
+          </a:bodyPr>
+          <a:lstStyle/>
+          <a:p>
+            <a:r>
+              <a:rPr lang="en-US" sz="1400" dirty="0" smtClean="0">
                 <a:solidFill>
-                  <a:schemeClr val="bg1"/>
+                  <a:schemeClr val="accent5">
+                    <a:lumMod val="75000"/>
+                  </a:schemeClr>
                 </a:solidFill>
               </a:rPr>
-              <a:t>:Logic</a:t>
-            </a:r>
-            <a:endParaRPr lang="en-SG" sz="1600" dirty="0">
+              <a:t>post(</a:t>
+            </a:r>
+            <a:r>
+              <a:rPr lang="en-US" sz="1400" dirty="0" err="1" smtClean="0">
+                <a:solidFill>
+                  <a:schemeClr val="accent5">
+                    <a:lumMod val="75000"/>
+                  </a:schemeClr>
+                </a:solidFill>
+              </a:rPr>
+              <a:t>AddressBookChangedEvent</a:t>
+            </a:r>
+            <a:r>
+              <a:rPr lang="en-US" sz="1400" dirty="0" smtClean="0">
+                <a:solidFill>
+                  <a:schemeClr val="accent5">
+                    <a:lumMod val="75000"/>
+                  </a:schemeClr>
+                </a:solidFill>
+              </a:rPr>
+              <a:t>)</a:t>
+            </a:r>
+            <a:endParaRPr lang="en-US" sz="1400" dirty="0">
               <a:solidFill>
-                <a:schemeClr val="bg1"/>
+                <a:schemeClr val="accent5">
+                  <a:lumMod val="75000"/>
+                </a:schemeClr>
               </a:solidFill>
             </a:endParaRPr>
           </a:p>
@@ -3873,258 +3685,27 @@
       </p:sp>
       <p:cxnSp>
         <p:nvCxnSpPr>
-          <p:cNvPr id="17" name="Straight Connector 16"/>
+          <p:cNvPr id="63" name="Straight Arrow Connector 62"/>
           <p:cNvCxnSpPr/>
           <p:nvPr/>
         </p:nvCxnSpPr>
         <p:spPr>
-          <a:xfrm>
-            <a:off x="3882400" y="975284"/>
-            <a:ext cx="0" cy="1723059"/>
-          </a:xfrm>
-          <a:prstGeom prst="line">
-            <a:avLst/>
-          </a:prstGeom>
-          <a:ln w="19050">
-            <a:solidFill>
-              <a:srgbClr val="0070C0"/>
-            </a:solidFill>
-            <a:prstDash val="sysDash"/>
-          </a:ln>
-          <a:effectLst/>
-        </p:spPr>
-        <p:style>
-          <a:lnRef idx="1">
-            <a:schemeClr val="accent1"/>
-          </a:lnRef>
-          <a:fillRef idx="2">
-            <a:schemeClr val="accent1"/>
-          </a:fillRef>
-          <a:effectRef idx="1">
-            <a:schemeClr val="accent1"/>
-          </a:effectRef>
-          <a:fontRef idx="minor">
-            <a:schemeClr val="dk1"/>
-          </a:fontRef>
-        </p:style>
-      </p:cxnSp>
-      <p:sp>
-        <p:nvSpPr>
-          <p:cNvPr id="18" name="Rectangle 17"/>
-          <p:cNvSpPr/>
-          <p:nvPr/>
-        </p:nvSpPr>
-        <p:spPr>
-          <a:xfrm>
-            <a:off x="3810392" y="1433477"/>
-            <a:ext cx="144016" cy="832525"/>
-          </a:xfrm>
-          <a:prstGeom prst="rect">
-            <a:avLst/>
-          </a:prstGeom>
-          <a:solidFill>
-            <a:srgbClr val="0070C0"/>
-          </a:solidFill>
-          <a:ln>
-            <a:solidFill>
-              <a:srgbClr val="0070C0"/>
-            </a:solidFill>
-          </a:ln>
-          <a:effectLst/>
-        </p:spPr>
-        <p:style>
-          <a:lnRef idx="1">
-            <a:schemeClr val="accent3"/>
-          </a:lnRef>
-          <a:fillRef idx="2">
-            <a:schemeClr val="accent3"/>
-          </a:fillRef>
-          <a:effectRef idx="1">
-            <a:schemeClr val="accent3"/>
-          </a:effectRef>
-          <a:fontRef idx="minor">
-            <a:schemeClr val="dk1"/>
-          </a:fontRef>
-        </p:style>
-        <p:txBody>
-          <a:bodyPr rtlCol="0" anchor="ctr"/>
-          <a:lstStyle/>
-          <a:p>
-            <a:pPr algn="ctr"/>
-            <a:endParaRPr lang="en-SG" sz="1400">
-              <a:solidFill>
-                <a:schemeClr val="dk1"/>
-              </a:solidFill>
-            </a:endParaRPr>
-          </a:p>
-        </p:txBody>
-      </p:sp>
-      <p:sp>
-        <p:nvSpPr>
-          <p:cNvPr id="19" name="Rectangle 62"/>
-          <p:cNvSpPr/>
-          <p:nvPr/>
-        </p:nvSpPr>
-        <p:spPr>
-          <a:xfrm>
-            <a:off x="5316783" y="607926"/>
-            <a:ext cx="1093635" cy="346760"/>
-          </a:xfrm>
-          <a:prstGeom prst="rect">
-            <a:avLst/>
-          </a:prstGeom>
-          <a:solidFill>
-            <a:srgbClr val="7030A0"/>
-          </a:solidFill>
-          <a:ln w="19050">
-            <a:solidFill>
-              <a:srgbClr val="7030A0"/>
-            </a:solidFill>
-          </a:ln>
-          <a:effectLst/>
-        </p:spPr>
-        <p:style>
-          <a:lnRef idx="1">
-            <a:schemeClr val="accent2"/>
-          </a:lnRef>
-          <a:fillRef idx="2">
-            <a:schemeClr val="accent2"/>
-          </a:fillRef>
-          <a:effectRef idx="1">
-            <a:schemeClr val="accent2"/>
-          </a:effectRef>
-          <a:fontRef idx="minor">
-            <a:schemeClr val="dk1"/>
-          </a:fontRef>
-        </p:style>
-        <p:txBody>
-          <a:bodyPr rtlCol="0" anchor="ctr"/>
-          <a:lstStyle/>
-          <a:p>
-            <a:pPr algn="ctr"/>
-            <a:r>
-              <a:rPr lang="en-US" sz="1600" dirty="0" smtClean="0">
-                <a:solidFill>
-                  <a:schemeClr val="bg1"/>
-                </a:solidFill>
-              </a:rPr>
-              <a:t>:Model</a:t>
-            </a:r>
-            <a:endParaRPr lang="en-SG" sz="1600" dirty="0">
-              <a:solidFill>
-                <a:schemeClr val="bg1"/>
-              </a:solidFill>
-            </a:endParaRPr>
-          </a:p>
-        </p:txBody>
-      </p:sp>
-      <p:cxnSp>
-        <p:nvCxnSpPr>
-          <p:cNvPr id="20" name="Straight Connector 19"/>
-          <p:cNvCxnSpPr/>
-          <p:nvPr/>
-        </p:nvCxnSpPr>
-        <p:spPr>
-          <a:xfrm>
-            <a:off x="5863600" y="971597"/>
-            <a:ext cx="0" cy="1723059"/>
-          </a:xfrm>
-          <a:prstGeom prst="line">
-            <a:avLst/>
-          </a:prstGeom>
-          <a:ln w="19050">
-            <a:solidFill>
-              <a:srgbClr val="7030A0"/>
-            </a:solidFill>
-            <a:prstDash val="sysDash"/>
-          </a:ln>
-          <a:effectLst/>
-        </p:spPr>
-        <p:style>
-          <a:lnRef idx="1">
-            <a:schemeClr val="accent1"/>
-          </a:lnRef>
-          <a:fillRef idx="2">
-            <a:schemeClr val="accent1"/>
-          </a:fillRef>
-          <a:effectRef idx="1">
-            <a:schemeClr val="accent1"/>
-          </a:effectRef>
-          <a:fontRef idx="minor">
-            <a:schemeClr val="dk1"/>
-          </a:fontRef>
-        </p:style>
-      </p:cxnSp>
-      <p:sp>
-        <p:nvSpPr>
-          <p:cNvPr id="21" name="Rectangle 20"/>
-          <p:cNvSpPr/>
-          <p:nvPr/>
-        </p:nvSpPr>
-        <p:spPr>
-          <a:xfrm>
-            <a:off x="5791592" y="1538408"/>
-            <a:ext cx="142006" cy="651394"/>
-          </a:xfrm>
-          <a:prstGeom prst="rect">
-            <a:avLst/>
-          </a:prstGeom>
-          <a:solidFill>
-            <a:srgbClr val="7030A0"/>
-          </a:solidFill>
-          <a:ln>
-            <a:solidFill>
-              <a:srgbClr val="7030A0"/>
-            </a:solidFill>
-          </a:ln>
-          <a:effectLst/>
-        </p:spPr>
-        <p:style>
-          <a:lnRef idx="1">
-            <a:schemeClr val="accent3"/>
-          </a:lnRef>
-          <a:fillRef idx="2">
-            <a:schemeClr val="accent3"/>
-          </a:fillRef>
-          <a:effectRef idx="1">
-            <a:schemeClr val="accent3"/>
-          </a:effectRef>
-          <a:fontRef idx="minor">
-            <a:schemeClr val="dk1"/>
-          </a:fontRef>
-        </p:style>
-        <p:txBody>
-          <a:bodyPr rtlCol="0" anchor="ctr"/>
-          <a:lstStyle/>
-          <a:p>
-            <a:pPr algn="ctr"/>
-            <a:endParaRPr lang="en-SG" sz="1400">
-              <a:solidFill>
-                <a:schemeClr val="dk1"/>
-              </a:solidFill>
-            </a:endParaRPr>
-          </a:p>
-        </p:txBody>
-      </p:sp>
-      <p:cxnSp>
-        <p:nvCxnSpPr>
-          <p:cNvPr id="23" name="Straight Arrow Connector 22"/>
-          <p:cNvCxnSpPr/>
-          <p:nvPr/>
-        </p:nvCxnSpPr>
-        <p:spPr>
-          <a:xfrm>
-            <a:off x="466818" y="1325979"/>
-            <a:ext cx="1119851" cy="0"/>
+          <a:xfrm flipH="1">
+            <a:off x="4526729" y="4316549"/>
+            <a:ext cx="3383941" cy="0"/>
           </a:xfrm>
           <a:prstGeom prst="straightConnector1">
             <a:avLst/>
           </a:prstGeom>
           <a:ln w="19050">
             <a:solidFill>
-              <a:schemeClr val="tx1"/>
+              <a:schemeClr val="accent6">
+                <a:lumMod val="75000"/>
+              </a:schemeClr>
             </a:solidFill>
-            <a:tailEnd type="arrow"/>
+            <a:prstDash val="sysDash"/>
+            <a:headEnd type="none" w="med" len="med"/>
+            <a:tailEnd type="arrow" w="med" len="med"/>
           </a:ln>
         </p:spPr>
         <p:style>
@@ -4144,375 +3725,13 @@
       </p:cxnSp>
       <p:sp>
         <p:nvSpPr>
-          <p:cNvPr id="24" name="TextBox 23"/>
-          <p:cNvSpPr txBox="1"/>
+          <p:cNvPr id="66" name="Rectangle 62"/>
+          <p:cNvSpPr/>
           <p:nvPr/>
         </p:nvSpPr>
         <p:spPr>
           <a:xfrm>
-            <a:off x="466818" y="1345880"/>
-            <a:ext cx="860170" cy="215444"/>
-          </a:xfrm>
-          <a:prstGeom prst="rect">
-            <a:avLst/>
-          </a:prstGeom>
-          <a:noFill/>
-        </p:spPr>
-        <p:txBody>
-          <a:bodyPr wrap="square" lIns="0" tIns="0" rIns="0" bIns="0" rtlCol="0">
-            <a:spAutoFit/>
-          </a:bodyPr>
-          <a:lstStyle/>
-          <a:p>
-            <a:r>
-              <a:rPr lang="en-US" sz="1400" dirty="0" smtClean="0"/>
-              <a:t>delete 1</a:t>
-            </a:r>
-            <a:endParaRPr lang="en-US" sz="1400" dirty="0"/>
-          </a:p>
-        </p:txBody>
-      </p:sp>
-      <p:cxnSp>
-        <p:nvCxnSpPr>
-          <p:cNvPr id="25" name="Straight Arrow Connector 24"/>
-          <p:cNvCxnSpPr/>
-          <p:nvPr/>
-        </p:nvCxnSpPr>
-        <p:spPr>
-          <a:xfrm>
-            <a:off x="1739069" y="1433478"/>
-            <a:ext cx="2071323" cy="0"/>
-          </a:xfrm>
-          <a:prstGeom prst="straightConnector1">
-            <a:avLst/>
-          </a:prstGeom>
-          <a:ln w="19050">
-            <a:solidFill>
-              <a:srgbClr val="00B050"/>
-            </a:solidFill>
-            <a:tailEnd type="arrow"/>
-          </a:ln>
-        </p:spPr>
-        <p:style>
-          <a:lnRef idx="1">
-            <a:schemeClr val="accent1"/>
-          </a:lnRef>
-          <a:fillRef idx="0">
-            <a:schemeClr val="accent1"/>
-          </a:fillRef>
-          <a:effectRef idx="0">
-            <a:schemeClr val="accent1"/>
-          </a:effectRef>
-          <a:fontRef idx="minor">
-            <a:schemeClr val="tx1"/>
-          </a:fontRef>
-        </p:style>
-      </p:cxnSp>
-      <p:sp>
-        <p:nvSpPr>
-          <p:cNvPr id="26" name="TextBox 25"/>
-          <p:cNvSpPr txBox="1"/>
-          <p:nvPr/>
-        </p:nvSpPr>
-        <p:spPr>
-          <a:xfrm>
-            <a:off x="2166172" y="1453379"/>
-            <a:ext cx="1424846" cy="215444"/>
-          </a:xfrm>
-          <a:prstGeom prst="rect">
-            <a:avLst/>
-          </a:prstGeom>
-          <a:noFill/>
-        </p:spPr>
-        <p:txBody>
-          <a:bodyPr wrap="square" lIns="0" tIns="0" rIns="0" bIns="0" rtlCol="0">
-            <a:spAutoFit/>
-          </a:bodyPr>
-          <a:lstStyle/>
-          <a:p>
-            <a:r>
-              <a:rPr lang="en-US" sz="1400" dirty="0" smtClean="0">
-                <a:solidFill>
-                  <a:srgbClr val="0070C0"/>
-                </a:solidFill>
-              </a:rPr>
-              <a:t>execute(“delete 1”)</a:t>
-            </a:r>
-            <a:endParaRPr lang="en-US" sz="1400" dirty="0">
-              <a:solidFill>
-                <a:srgbClr val="0070C0"/>
-              </a:solidFill>
-            </a:endParaRPr>
-          </a:p>
-        </p:txBody>
-      </p:sp>
-      <p:cxnSp>
-        <p:nvCxnSpPr>
-          <p:cNvPr id="28" name="Straight Arrow Connector 27"/>
-          <p:cNvCxnSpPr/>
-          <p:nvPr/>
-        </p:nvCxnSpPr>
-        <p:spPr>
-          <a:xfrm>
-            <a:off x="3954408" y="1538409"/>
-            <a:ext cx="1837184" cy="0"/>
-          </a:xfrm>
-          <a:prstGeom prst="straightConnector1">
-            <a:avLst/>
-          </a:prstGeom>
-          <a:ln w="19050">
-            <a:solidFill>
-              <a:srgbClr val="0070C0"/>
-            </a:solidFill>
-            <a:tailEnd type="arrow"/>
-          </a:ln>
-        </p:spPr>
-        <p:style>
-          <a:lnRef idx="1">
-            <a:schemeClr val="accent1"/>
-          </a:lnRef>
-          <a:fillRef idx="0">
-            <a:schemeClr val="accent1"/>
-          </a:fillRef>
-          <a:effectRef idx="0">
-            <a:schemeClr val="accent1"/>
-          </a:effectRef>
-          <a:fontRef idx="minor">
-            <a:schemeClr val="tx1"/>
-          </a:fontRef>
-        </p:style>
-      </p:cxnSp>
-      <p:sp>
-        <p:nvSpPr>
-          <p:cNvPr id="29" name="TextBox 28"/>
-          <p:cNvSpPr txBox="1"/>
-          <p:nvPr/>
-        </p:nvSpPr>
-        <p:spPr>
-          <a:xfrm>
-            <a:off x="4299772" y="1542583"/>
-            <a:ext cx="1424846" cy="215444"/>
-          </a:xfrm>
-          <a:prstGeom prst="rect">
-            <a:avLst/>
-          </a:prstGeom>
-          <a:noFill/>
-        </p:spPr>
-        <p:txBody>
-          <a:bodyPr wrap="square" lIns="0" tIns="0" rIns="0" bIns="0" rtlCol="0">
-            <a:spAutoFit/>
-          </a:bodyPr>
-          <a:lstStyle/>
-          <a:p>
-            <a:r>
-              <a:rPr lang="en-US" sz="1400" dirty="0" err="1" smtClean="0">
-                <a:solidFill>
-                  <a:srgbClr val="7030A0"/>
-                </a:solidFill>
-              </a:rPr>
-              <a:t>deletePerson</a:t>
-            </a:r>
-            <a:r>
-              <a:rPr lang="en-US" sz="1400" dirty="0" smtClean="0">
-                <a:solidFill>
-                  <a:srgbClr val="7030A0"/>
-                </a:solidFill>
-              </a:rPr>
-              <a:t>(p)</a:t>
-            </a:r>
-            <a:endParaRPr lang="en-US" sz="1400" dirty="0">
-              <a:solidFill>
-                <a:srgbClr val="7030A0"/>
-              </a:solidFill>
-            </a:endParaRPr>
-          </a:p>
-        </p:txBody>
-      </p:sp>
-      <p:sp>
-        <p:nvSpPr>
-          <p:cNvPr id="33" name="TextBox 32"/>
-          <p:cNvSpPr txBox="1"/>
-          <p:nvPr/>
-        </p:nvSpPr>
-        <p:spPr>
-          <a:xfrm>
-            <a:off x="6074030" y="1687656"/>
-            <a:ext cx="2438400" cy="215444"/>
-          </a:xfrm>
-          <a:prstGeom prst="rect">
-            <a:avLst/>
-          </a:prstGeom>
-          <a:noFill/>
-        </p:spPr>
-        <p:txBody>
-          <a:bodyPr wrap="square" lIns="0" tIns="0" rIns="0" bIns="0" rtlCol="0">
-            <a:spAutoFit/>
-          </a:bodyPr>
-          <a:lstStyle/>
-          <a:p>
-            <a:r>
-              <a:rPr lang="en-US" sz="1400" dirty="0" smtClean="0">
-                <a:solidFill>
-                  <a:schemeClr val="accent5">
-                    <a:lumMod val="75000"/>
-                  </a:schemeClr>
-                </a:solidFill>
-              </a:rPr>
-              <a:t>post(</a:t>
-            </a:r>
-            <a:r>
-              <a:rPr lang="en-US" sz="1400" dirty="0" err="1" smtClean="0">
-                <a:solidFill>
-                  <a:schemeClr val="accent5">
-                    <a:lumMod val="75000"/>
-                  </a:schemeClr>
-                </a:solidFill>
-              </a:rPr>
-              <a:t>AddressBookChangedEvent</a:t>
-            </a:r>
-            <a:r>
-              <a:rPr lang="en-US" sz="1400" dirty="0" smtClean="0">
-                <a:solidFill>
-                  <a:schemeClr val="accent5">
-                    <a:lumMod val="75000"/>
-                  </a:schemeClr>
-                </a:solidFill>
-              </a:rPr>
-              <a:t>)</a:t>
-            </a:r>
-            <a:endParaRPr lang="en-US" sz="1400" dirty="0">
-              <a:solidFill>
-                <a:schemeClr val="accent5">
-                  <a:lumMod val="75000"/>
-                </a:schemeClr>
-              </a:solidFill>
-            </a:endParaRPr>
-          </a:p>
-        </p:txBody>
-      </p:sp>
-      <p:cxnSp>
-        <p:nvCxnSpPr>
-          <p:cNvPr id="34" name="Straight Arrow Connector 33"/>
-          <p:cNvCxnSpPr/>
-          <p:nvPr/>
-        </p:nvCxnSpPr>
-        <p:spPr>
-          <a:xfrm>
-            <a:off x="3954408" y="2190681"/>
-            <a:ext cx="1837184" cy="0"/>
-          </a:xfrm>
-          <a:prstGeom prst="straightConnector1">
-            <a:avLst/>
-          </a:prstGeom>
-          <a:ln w="19050">
-            <a:solidFill>
-              <a:srgbClr val="7030A0"/>
-            </a:solidFill>
-            <a:prstDash val="sysDash"/>
-            <a:headEnd type="arrow" w="med" len="med"/>
-            <a:tailEnd type="none" w="med" len="med"/>
-          </a:ln>
-        </p:spPr>
-        <p:style>
-          <a:lnRef idx="1">
-            <a:schemeClr val="accent1"/>
-          </a:lnRef>
-          <a:fillRef idx="0">
-            <a:schemeClr val="accent1"/>
-          </a:fillRef>
-          <a:effectRef idx="0">
-            <a:schemeClr val="accent1"/>
-          </a:effectRef>
-          <a:fontRef idx="minor">
-            <a:schemeClr val="tx1"/>
-          </a:fontRef>
-        </p:style>
-      </p:cxnSp>
-      <p:cxnSp>
-        <p:nvCxnSpPr>
-          <p:cNvPr id="35" name="Straight Arrow Connector 34"/>
-          <p:cNvCxnSpPr/>
-          <p:nvPr/>
-        </p:nvCxnSpPr>
-        <p:spPr>
-          <a:xfrm>
-            <a:off x="1739069" y="2266002"/>
-            <a:ext cx="2058118" cy="0"/>
-          </a:xfrm>
-          <a:prstGeom prst="straightConnector1">
-            <a:avLst/>
-          </a:prstGeom>
-          <a:ln w="19050">
-            <a:solidFill>
-              <a:srgbClr val="0070C0"/>
-            </a:solidFill>
-            <a:prstDash val="sysDash"/>
-            <a:headEnd type="arrow" w="med" len="med"/>
-            <a:tailEnd type="none" w="med" len="med"/>
-          </a:ln>
-        </p:spPr>
-        <p:style>
-          <a:lnRef idx="1">
-            <a:schemeClr val="accent1"/>
-          </a:lnRef>
-          <a:fillRef idx="0">
-            <a:schemeClr val="accent1"/>
-          </a:fillRef>
-          <a:effectRef idx="0">
-            <a:schemeClr val="accent1"/>
-          </a:effectRef>
-          <a:fontRef idx="minor">
-            <a:schemeClr val="tx1"/>
-          </a:fontRef>
-        </p:style>
-      </p:cxnSp>
-      <p:cxnSp>
-        <p:nvCxnSpPr>
-          <p:cNvPr id="37" name="Straight Arrow Connector 36"/>
-          <p:cNvCxnSpPr/>
-          <p:nvPr/>
-        </p:nvCxnSpPr>
-        <p:spPr>
-          <a:xfrm>
-            <a:off x="390618" y="2342202"/>
-            <a:ext cx="1196051" cy="0"/>
-          </a:xfrm>
-          <a:prstGeom prst="straightConnector1">
-            <a:avLst/>
-          </a:prstGeom>
-          <a:ln w="19050">
-            <a:solidFill>
-              <a:srgbClr val="00B050"/>
-            </a:solidFill>
-            <a:prstDash val="sysDash"/>
-            <a:headEnd type="arrow" w="med" len="med"/>
-            <a:tailEnd type="none" w="med" len="med"/>
-          </a:ln>
-        </p:spPr>
-        <p:style>
-          <a:lnRef idx="1">
-            <a:schemeClr val="accent1"/>
-          </a:lnRef>
-          <a:fillRef idx="0">
-            <a:schemeClr val="accent1"/>
-          </a:fillRef>
-          <a:effectRef idx="0">
-            <a:schemeClr val="accent1"/>
-          </a:effectRef>
-          <a:fontRef idx="minor">
-            <a:schemeClr val="tx1"/>
-          </a:fontRef>
-        </p:style>
-      </p:cxnSp>
-      <p:sp>
-        <p:nvSpPr>
-          <p:cNvPr id="39" name="Rectangle 62"/>
-          <p:cNvSpPr/>
-          <p:nvPr/>
-        </p:nvSpPr>
-        <p:spPr>
-          <a:xfrm>
-            <a:off x="7696200" y="591251"/>
+            <a:off x="3791146" y="2988711"/>
             <a:ext cx="1371600" cy="346760"/>
           </a:xfrm>
           <a:prstGeom prst="rect">
@@ -4577,13 +3796,13 @@
       </p:sp>
       <p:cxnSp>
         <p:nvCxnSpPr>
-          <p:cNvPr id="40" name="Straight Connector 39"/>
+          <p:cNvPr id="67" name="Straight Connector 66"/>
           <p:cNvCxnSpPr/>
           <p:nvPr/>
         </p:nvCxnSpPr>
         <p:spPr>
           <a:xfrm>
-            <a:off x="8616802" y="944305"/>
+            <a:off x="4456731" y="3341765"/>
             <a:ext cx="0" cy="1723059"/>
           </a:xfrm>
           <a:prstGeom prst="line">
@@ -4616,513 +3835,13 @@
       </p:cxnSp>
       <p:sp>
         <p:nvSpPr>
-          <p:cNvPr id="41" name="Rectangle 40"/>
-          <p:cNvSpPr/>
-          <p:nvPr/>
-        </p:nvSpPr>
-        <p:spPr>
-          <a:xfrm>
-            <a:off x="8544794" y="1961202"/>
-            <a:ext cx="142006" cy="176787"/>
-          </a:xfrm>
-          <a:prstGeom prst="rect">
-            <a:avLst/>
-          </a:prstGeom>
-          <a:solidFill>
-            <a:schemeClr val="accent5">
-              <a:lumMod val="75000"/>
-            </a:schemeClr>
-          </a:solidFill>
-          <a:ln>
-            <a:solidFill>
-              <a:schemeClr val="accent5">
-                <a:lumMod val="75000"/>
-              </a:schemeClr>
-            </a:solidFill>
-          </a:ln>
-          <a:effectLst/>
-        </p:spPr>
-        <p:style>
-          <a:lnRef idx="1">
-            <a:schemeClr val="accent3"/>
-          </a:lnRef>
-          <a:fillRef idx="2">
-            <a:schemeClr val="accent3"/>
-          </a:fillRef>
-          <a:effectRef idx="1">
-            <a:schemeClr val="accent3"/>
-          </a:effectRef>
-          <a:fontRef idx="minor">
-            <a:schemeClr val="dk1"/>
-          </a:fontRef>
-        </p:style>
-        <p:txBody>
-          <a:bodyPr rtlCol="0" anchor="ctr"/>
-          <a:lstStyle/>
-          <a:p>
-            <a:pPr algn="ctr"/>
-            <a:endParaRPr lang="en-SG" sz="1400">
-              <a:solidFill>
-                <a:schemeClr val="dk1"/>
-              </a:solidFill>
-            </a:endParaRPr>
-          </a:p>
-        </p:txBody>
-      </p:sp>
-      <p:cxnSp>
-        <p:nvCxnSpPr>
-          <p:cNvPr id="42" name="Straight Arrow Connector 41"/>
-          <p:cNvCxnSpPr/>
-          <p:nvPr/>
-        </p:nvCxnSpPr>
-        <p:spPr>
-          <a:xfrm>
-            <a:off x="5943992" y="1961202"/>
-            <a:ext cx="2568438" cy="0"/>
-          </a:xfrm>
-          <a:prstGeom prst="straightConnector1">
-            <a:avLst/>
-          </a:prstGeom>
-          <a:ln w="19050">
-            <a:solidFill>
-              <a:srgbClr val="7030A0"/>
-            </a:solidFill>
-            <a:tailEnd type="arrow"/>
-          </a:ln>
-        </p:spPr>
-        <p:style>
-          <a:lnRef idx="1">
-            <a:schemeClr val="accent1"/>
-          </a:lnRef>
-          <a:fillRef idx="0">
-            <a:schemeClr val="accent1"/>
-          </a:fillRef>
-          <a:effectRef idx="0">
-            <a:schemeClr val="accent1"/>
-          </a:effectRef>
-          <a:fontRef idx="minor">
-            <a:schemeClr val="tx1"/>
-          </a:fontRef>
-        </p:style>
-      </p:cxnSp>
-      <p:cxnSp>
-        <p:nvCxnSpPr>
-          <p:cNvPr id="44" name="Straight Arrow Connector 43"/>
-          <p:cNvCxnSpPr/>
-          <p:nvPr/>
-        </p:nvCxnSpPr>
-        <p:spPr>
-          <a:xfrm>
-            <a:off x="5943992" y="2137989"/>
-            <a:ext cx="2549946" cy="0"/>
-          </a:xfrm>
-          <a:prstGeom prst="straightConnector1">
-            <a:avLst/>
-          </a:prstGeom>
-          <a:ln w="19050">
-            <a:solidFill>
-              <a:schemeClr val="accent5">
-                <a:lumMod val="75000"/>
-              </a:schemeClr>
-            </a:solidFill>
-            <a:prstDash val="sysDash"/>
-            <a:headEnd type="arrow" w="med" len="med"/>
-            <a:tailEnd type="none" w="med" len="med"/>
-          </a:ln>
-        </p:spPr>
-        <p:style>
-          <a:lnRef idx="1">
-            <a:schemeClr val="accent1"/>
-          </a:lnRef>
-          <a:fillRef idx="0">
-            <a:schemeClr val="accent1"/>
-          </a:fillRef>
-          <a:effectRef idx="0">
-            <a:schemeClr val="accent1"/>
-          </a:effectRef>
-          <a:fontRef idx="minor">
-            <a:schemeClr val="tx1"/>
-          </a:fontRef>
-        </p:style>
-      </p:cxnSp>
-      <p:sp>
-        <p:nvSpPr>
-          <p:cNvPr id="53" name="Rectangle 62"/>
-          <p:cNvSpPr/>
-          <p:nvPr/>
-        </p:nvSpPr>
-        <p:spPr>
-          <a:xfrm>
-            <a:off x="7370178" y="4278322"/>
-            <a:ext cx="1093635" cy="346760"/>
-          </a:xfrm>
-          <a:prstGeom prst="rect">
-            <a:avLst/>
-          </a:prstGeom>
-          <a:solidFill>
-            <a:schemeClr val="accent6">
-              <a:lumMod val="75000"/>
-            </a:schemeClr>
-          </a:solidFill>
-          <a:ln w="19050">
-            <a:solidFill>
-              <a:schemeClr val="accent6">
-                <a:lumMod val="75000"/>
-              </a:schemeClr>
-            </a:solidFill>
-          </a:ln>
-          <a:effectLst/>
-        </p:spPr>
-        <p:style>
-          <a:lnRef idx="1">
-            <a:schemeClr val="accent2"/>
-          </a:lnRef>
-          <a:fillRef idx="2">
-            <a:schemeClr val="accent2"/>
-          </a:fillRef>
-          <a:effectRef idx="1">
-            <a:schemeClr val="accent2"/>
-          </a:effectRef>
-          <a:fontRef idx="minor">
-            <a:schemeClr val="dk1"/>
-          </a:fontRef>
-        </p:style>
-        <p:txBody>
-          <a:bodyPr rtlCol="0" anchor="ctr"/>
-          <a:lstStyle/>
-          <a:p>
-            <a:pPr algn="ctr"/>
-            <a:r>
-              <a:rPr lang="en-US" sz="1600" dirty="0" smtClean="0">
-                <a:solidFill>
-                  <a:schemeClr val="bg1"/>
-                </a:solidFill>
-              </a:rPr>
-              <a:t>:Storage</a:t>
-            </a:r>
-            <a:endParaRPr lang="en-SG" sz="1600" dirty="0">
-              <a:solidFill>
-                <a:schemeClr val="bg1"/>
-              </a:solidFill>
-            </a:endParaRPr>
-          </a:p>
-        </p:txBody>
-      </p:sp>
-      <p:cxnSp>
-        <p:nvCxnSpPr>
-          <p:cNvPr id="54" name="Straight Connector 53"/>
-          <p:cNvCxnSpPr/>
-          <p:nvPr/>
-        </p:nvCxnSpPr>
-        <p:spPr>
-          <a:xfrm>
-            <a:off x="7916995" y="4641993"/>
-            <a:ext cx="0" cy="1723059"/>
-          </a:xfrm>
-          <a:prstGeom prst="line">
-            <a:avLst/>
-          </a:prstGeom>
-          <a:ln w="19050">
-            <a:solidFill>
-              <a:schemeClr val="accent6">
-                <a:lumMod val="75000"/>
-              </a:schemeClr>
-            </a:solidFill>
-            <a:prstDash val="sysDash"/>
-          </a:ln>
-          <a:effectLst/>
-        </p:spPr>
-        <p:style>
-          <a:lnRef idx="1">
-            <a:schemeClr val="accent1"/>
-          </a:lnRef>
-          <a:fillRef idx="2">
-            <a:schemeClr val="accent1"/>
-          </a:fillRef>
-          <a:effectRef idx="1">
-            <a:schemeClr val="accent1"/>
-          </a:effectRef>
-          <a:fontRef idx="minor">
-            <a:schemeClr val="dk1"/>
-          </a:fontRef>
-        </p:style>
-      </p:cxnSp>
-      <p:sp>
-        <p:nvSpPr>
-          <p:cNvPr id="55" name="Rectangle 54"/>
-          <p:cNvSpPr/>
-          <p:nvPr/>
-        </p:nvSpPr>
-        <p:spPr>
-          <a:xfrm>
-            <a:off x="7844987" y="5335662"/>
-            <a:ext cx="124478" cy="287409"/>
-          </a:xfrm>
-          <a:prstGeom prst="rect">
-            <a:avLst/>
-          </a:prstGeom>
-          <a:solidFill>
-            <a:schemeClr val="accent6">
-              <a:lumMod val="75000"/>
-            </a:schemeClr>
-          </a:solidFill>
-          <a:ln>
-            <a:solidFill>
-              <a:schemeClr val="accent6">
-                <a:lumMod val="75000"/>
-              </a:schemeClr>
-            </a:solidFill>
-          </a:ln>
-          <a:effectLst/>
-        </p:spPr>
-        <p:style>
-          <a:lnRef idx="1">
-            <a:schemeClr val="accent3"/>
-          </a:lnRef>
-          <a:fillRef idx="2">
-            <a:schemeClr val="accent3"/>
-          </a:fillRef>
-          <a:effectRef idx="1">
-            <a:schemeClr val="accent3"/>
-          </a:effectRef>
-          <a:fontRef idx="minor">
-            <a:schemeClr val="dk1"/>
-          </a:fontRef>
-        </p:style>
-        <p:txBody>
-          <a:bodyPr rtlCol="0" anchor="ctr"/>
-          <a:lstStyle/>
-          <a:p>
-            <a:pPr algn="ctr"/>
-            <a:endParaRPr lang="en-SG" sz="1400">
-              <a:solidFill>
-                <a:schemeClr val="dk1"/>
-              </a:solidFill>
-            </a:endParaRPr>
-          </a:p>
-        </p:txBody>
-      </p:sp>
-      <p:sp>
-        <p:nvSpPr>
-          <p:cNvPr id="62" name="TextBox 61"/>
-          <p:cNvSpPr txBox="1"/>
-          <p:nvPr/>
-        </p:nvSpPr>
-        <p:spPr>
-          <a:xfrm>
-            <a:off x="1810094" y="4797674"/>
-            <a:ext cx="2716635" cy="215444"/>
-          </a:xfrm>
-          <a:prstGeom prst="rect">
-            <a:avLst/>
-          </a:prstGeom>
-          <a:noFill/>
-        </p:spPr>
-        <p:txBody>
-          <a:bodyPr wrap="square" lIns="0" tIns="0" rIns="0" bIns="0" rtlCol="0">
-            <a:spAutoFit/>
-          </a:bodyPr>
-          <a:lstStyle/>
-          <a:p>
-            <a:r>
-              <a:rPr lang="en-US" sz="1400" dirty="0" smtClean="0">
-                <a:solidFill>
-                  <a:schemeClr val="accent5">
-                    <a:lumMod val="75000"/>
-                  </a:schemeClr>
-                </a:solidFill>
-              </a:rPr>
-              <a:t>post(</a:t>
-            </a:r>
-            <a:r>
-              <a:rPr lang="en-US" sz="1400" dirty="0" err="1" smtClean="0">
-                <a:solidFill>
-                  <a:schemeClr val="accent5">
-                    <a:lumMod val="75000"/>
-                  </a:schemeClr>
-                </a:solidFill>
-              </a:rPr>
-              <a:t>AddressBookChangedEvent</a:t>
-            </a:r>
-            <a:r>
-              <a:rPr lang="en-US" sz="1400" dirty="0" smtClean="0">
-                <a:solidFill>
-                  <a:schemeClr val="accent5">
-                    <a:lumMod val="75000"/>
-                  </a:schemeClr>
-                </a:solidFill>
-              </a:rPr>
-              <a:t>)</a:t>
-            </a:r>
-            <a:endParaRPr lang="en-US" sz="1400" dirty="0">
-              <a:solidFill>
-                <a:schemeClr val="accent5">
-                  <a:lumMod val="75000"/>
-                </a:schemeClr>
-              </a:solidFill>
-            </a:endParaRPr>
-          </a:p>
-        </p:txBody>
-      </p:sp>
-      <p:cxnSp>
-        <p:nvCxnSpPr>
-          <p:cNvPr id="63" name="Straight Arrow Connector 62"/>
-          <p:cNvCxnSpPr/>
-          <p:nvPr/>
-        </p:nvCxnSpPr>
-        <p:spPr>
-          <a:xfrm flipH="1">
-            <a:off x="4526729" y="5623071"/>
-            <a:ext cx="3383941" cy="0"/>
-          </a:xfrm>
-          <a:prstGeom prst="straightConnector1">
-            <a:avLst/>
-          </a:prstGeom>
-          <a:ln w="19050">
-            <a:solidFill>
-              <a:schemeClr val="accent6">
-                <a:lumMod val="75000"/>
-              </a:schemeClr>
-            </a:solidFill>
-            <a:prstDash val="sysDash"/>
-            <a:headEnd type="none" w="med" len="med"/>
-            <a:tailEnd type="arrow" w="med" len="med"/>
-          </a:ln>
-        </p:spPr>
-        <p:style>
-          <a:lnRef idx="1">
-            <a:schemeClr val="accent1"/>
-          </a:lnRef>
-          <a:fillRef idx="0">
-            <a:schemeClr val="accent1"/>
-          </a:fillRef>
-          <a:effectRef idx="0">
-            <a:schemeClr val="accent1"/>
-          </a:effectRef>
-          <a:fontRef idx="minor">
-            <a:schemeClr val="tx1"/>
-          </a:fontRef>
-        </p:style>
-      </p:cxnSp>
-      <p:sp>
-        <p:nvSpPr>
-          <p:cNvPr id="66" name="Rectangle 62"/>
-          <p:cNvSpPr/>
-          <p:nvPr/>
-        </p:nvSpPr>
-        <p:spPr>
-          <a:xfrm>
-            <a:off x="3791146" y="4295233"/>
-            <a:ext cx="1371600" cy="346760"/>
-          </a:xfrm>
-          <a:prstGeom prst="rect">
-            <a:avLst/>
-          </a:prstGeom>
-          <a:solidFill>
-            <a:schemeClr val="accent5">
-              <a:lumMod val="75000"/>
-            </a:schemeClr>
-          </a:solidFill>
-          <a:ln w="19050">
-            <a:solidFill>
-              <a:schemeClr val="accent5">
-                <a:lumMod val="75000"/>
-              </a:schemeClr>
-            </a:solidFill>
-          </a:ln>
-          <a:effectLst/>
-        </p:spPr>
-        <p:style>
-          <a:lnRef idx="1">
-            <a:schemeClr val="accent2"/>
-          </a:lnRef>
-          <a:fillRef idx="2">
-            <a:schemeClr val="accent2"/>
-          </a:fillRef>
-          <a:effectRef idx="1">
-            <a:schemeClr val="accent2"/>
-          </a:effectRef>
-          <a:fontRef idx="minor">
-            <a:schemeClr val="dk1"/>
-          </a:fontRef>
-        </p:style>
-        <p:txBody>
-          <a:bodyPr rtlCol="0" anchor="ctr"/>
-          <a:lstStyle/>
-          <a:p>
-            <a:pPr algn="ctr"/>
-            <a:r>
-              <a:rPr lang="en-US" sz="1600" dirty="0" smtClean="0">
-                <a:solidFill>
-                  <a:schemeClr val="bg1"/>
-                </a:solidFill>
-              </a:rPr>
-              <a:t>:</a:t>
-            </a:r>
-            <a:r>
-              <a:rPr lang="en-US" sz="1600" dirty="0" err="1" smtClean="0">
-                <a:solidFill>
-                  <a:schemeClr val="bg1"/>
-                </a:solidFill>
-              </a:rPr>
-              <a:t>EventsCenter</a:t>
-            </a:r>
-            <a:endParaRPr lang="en-SG" sz="1600" dirty="0">
-              <a:solidFill>
-                <a:schemeClr val="bg1"/>
-              </a:solidFill>
-            </a:endParaRPr>
-          </a:p>
-        </p:txBody>
-      </p:sp>
-      <p:cxnSp>
-        <p:nvCxnSpPr>
-          <p:cNvPr id="67" name="Straight Connector 66"/>
-          <p:cNvCxnSpPr/>
-          <p:nvPr/>
-        </p:nvCxnSpPr>
-        <p:spPr>
-          <a:xfrm>
-            <a:off x="4456731" y="4648287"/>
-            <a:ext cx="0" cy="1723059"/>
-          </a:xfrm>
-          <a:prstGeom prst="line">
-            <a:avLst/>
-          </a:prstGeom>
-          <a:ln w="19050">
-            <a:solidFill>
-              <a:schemeClr val="accent5">
-                <a:lumMod val="75000"/>
-              </a:schemeClr>
-            </a:solidFill>
-            <a:prstDash val="sysDash"/>
-          </a:ln>
-          <a:effectLst/>
-        </p:spPr>
-        <p:style>
-          <a:lnRef idx="1">
-            <a:schemeClr val="accent1"/>
-          </a:lnRef>
-          <a:fillRef idx="2">
-            <a:schemeClr val="accent1"/>
-          </a:fillRef>
-          <a:effectRef idx="1">
-            <a:schemeClr val="accent1"/>
-          </a:effectRef>
-          <a:fontRef idx="minor">
-            <a:schemeClr val="dk1"/>
-          </a:fontRef>
-        </p:style>
-      </p:cxnSp>
-      <p:sp>
-        <p:nvSpPr>
           <p:cNvPr id="68" name="Rectangle 67"/>
           <p:cNvSpPr/>
           <p:nvPr/>
         </p:nvSpPr>
         <p:spPr>
           <a:xfrm>
-            <a:off x="4384723" y="5071220"/>
+            <a:off x="4384723" y="3764698"/>
             <a:ext cx="142006" cy="1036757"/>
           </a:xfrm>
           <a:prstGeom prst="rect">
@@ -5177,7 +3896,7 @@
         </p:nvCxnSpPr>
         <p:spPr>
           <a:xfrm>
-            <a:off x="3078929" y="5071220"/>
+            <a:off x="3078929" y="3764698"/>
             <a:ext cx="1295400" cy="0"/>
           </a:xfrm>
           <a:prstGeom prst="straightConnector1">
@@ -5213,7 +3932,7 @@
         </p:nvCxnSpPr>
         <p:spPr>
           <a:xfrm>
-            <a:off x="2975642" y="6107977"/>
+            <a:off x="2975642" y="4801455"/>
             <a:ext cx="1448755" cy="0"/>
           </a:xfrm>
           <a:prstGeom prst="straightConnector1">
@@ -5253,7 +3972,7 @@
         </p:nvCxnSpPr>
         <p:spPr>
           <a:xfrm>
-            <a:off x="4526729" y="5341014"/>
+            <a:off x="4526729" y="4034492"/>
             <a:ext cx="3318258" cy="0"/>
           </a:xfrm>
           <a:prstGeom prst="straightConnector1">
@@ -5292,7 +4011,7 @@
         </p:nvSpPr>
         <p:spPr>
           <a:xfrm>
-            <a:off x="5036330" y="5065911"/>
+            <a:off x="5036330" y="3759389"/>
             <a:ext cx="2659870" cy="215444"/>
           </a:xfrm>
           <a:prstGeom prst="rect">
@@ -5336,43 +4055,6 @@
           </a:p>
         </p:txBody>
       </p:sp>
-      <p:cxnSp>
-        <p:nvCxnSpPr>
-          <p:cNvPr id="85" name="Straight Connector 84"/>
-          <p:cNvCxnSpPr/>
-          <p:nvPr/>
-        </p:nvCxnSpPr>
-        <p:spPr>
-          <a:xfrm flipH="1">
-            <a:off x="314394" y="1099672"/>
-            <a:ext cx="24" cy="1598671"/>
-          </a:xfrm>
-          <a:prstGeom prst="line">
-            <a:avLst/>
-          </a:prstGeom>
-          <a:ln w="19050">
-            <a:solidFill>
-              <a:schemeClr val="tx1"/>
-            </a:solidFill>
-            <a:prstDash val="sysDash"/>
-          </a:ln>
-          <a:effectLst/>
-        </p:spPr>
-        <p:style>
-          <a:lnRef idx="1">
-            <a:schemeClr val="accent1"/>
-          </a:lnRef>
-          <a:fillRef idx="2">
-            <a:schemeClr val="accent1"/>
-          </a:fillRef>
-          <a:effectRef idx="1">
-            <a:schemeClr val="accent1"/>
-          </a:effectRef>
-          <a:fontRef idx="minor">
-            <a:schemeClr val="dk1"/>
-          </a:fontRef>
-        </p:style>
-      </p:cxnSp>
       <p:sp>
         <p:nvSpPr>
           <p:cNvPr id="45" name="Rectangle 62"/>
@@ -5381,7 +4063,7 @@
         </p:nvSpPr>
         <p:spPr>
           <a:xfrm>
-            <a:off x="721634" y="4278322"/>
+            <a:off x="721634" y="2971800"/>
             <a:ext cx="1093635" cy="346760"/>
           </a:xfrm>
           <a:prstGeom prst="rect">
@@ -5440,7 +4122,7 @@
         </p:nvCxnSpPr>
         <p:spPr>
           <a:xfrm>
-            <a:off x="1268451" y="4641993"/>
+            <a:off x="1268451" y="3335471"/>
             <a:ext cx="0" cy="1723059"/>
           </a:xfrm>
           <a:prstGeom prst="line">
@@ -5477,7 +4159,7 @@
         </p:nvSpPr>
         <p:spPr>
           <a:xfrm>
-            <a:off x="1196443" y="5670472"/>
+            <a:off x="1196443" y="4363950"/>
             <a:ext cx="130545" cy="273128"/>
           </a:xfrm>
           <a:prstGeom prst="rect">
@@ -5528,7 +4210,7 @@
         </p:nvCxnSpPr>
         <p:spPr>
           <a:xfrm flipH="1">
-            <a:off x="1348843" y="5943600"/>
+            <a:off x="1348843" y="4637078"/>
             <a:ext cx="3061842" cy="0"/>
           </a:xfrm>
           <a:prstGeom prst="straightConnector1">
@@ -5566,7 +4248,7 @@
         </p:nvCxnSpPr>
         <p:spPr>
           <a:xfrm>
-            <a:off x="1348843" y="5670472"/>
+            <a:off x="1348843" y="4363950"/>
             <a:ext cx="3061841" cy="0"/>
           </a:xfrm>
           <a:prstGeom prst="straightConnector1">
@@ -5605,7 +4287,7 @@
         </p:nvSpPr>
         <p:spPr>
           <a:xfrm>
-            <a:off x="1416276" y="5395369"/>
+            <a:off x="1416276" y="4088847"/>
             <a:ext cx="2659870" cy="215444"/>
           </a:xfrm>
           <a:prstGeom prst="rect">
@@ -5651,7 +4333,7 @@
         </p:nvGrpSpPr>
         <p:grpSpPr>
           <a:xfrm>
-            <a:off x="1028134" y="5612032"/>
+            <a:off x="1028134" y="4305510"/>
             <a:ext cx="217349" cy="270072"/>
             <a:chOff x="1028134" y="5612032"/>
             <a:chExt cx="217349" cy="270072"/>
@@ -5810,7 +4492,7 @@
         </p:nvSpPr>
         <p:spPr>
           <a:xfrm>
-            <a:off x="194562" y="5444571"/>
+            <a:off x="194562" y="4138049"/>
             <a:ext cx="794081" cy="430887"/>
           </a:xfrm>
           <a:prstGeom prst="rect">
@@ -5849,7 +4531,7 @@
         </p:nvGrpSpPr>
         <p:grpSpPr>
           <a:xfrm flipH="1">
-            <a:off x="7936842" y="5335662"/>
+            <a:off x="7936842" y="4029140"/>
             <a:ext cx="217349" cy="270072"/>
             <a:chOff x="1028134" y="5612032"/>
             <a:chExt cx="217349" cy="270072"/>
@@ -6012,7 +4694,7 @@
         </p:nvSpPr>
         <p:spPr>
           <a:xfrm>
-            <a:off x="8223953" y="5180992"/>
+            <a:off x="8223953" y="3874470"/>
             <a:ext cx="539047" cy="430887"/>
           </a:xfrm>
           <a:prstGeom prst="rect">

</xml_diff>